<commit_message>
Changed subject code in footer
</commit_message>
<xml_diff>
--- a/4 - Multiple Linear Regression/Coefficient of Determination.pptx
+++ b/4 - Multiple Linear Regression/Coefficient of Determination.pptx
@@ -2590,7 +2590,7 @@
           <a:p>
             <a:fld id="{F666E1FD-E7A0-497B-BBC0-740BAAC97C64}" type="datetimeFigureOut">
               <a:rPr lang="en-PH" smtClean="0"/>
-              <a:t>9/18/23</a:t>
+              <a:t>7/11/24</a:t>
             </a:fld>
             <a:endParaRPr lang="en-PH"/>
           </a:p>
@@ -4013,9 +4013,9 @@
           <a:bodyPr/>
           <a:lstStyle/>
           <a:p>
-            <a:fld id="{0CCF0B81-6BD8-4C65-9459-815598C5F1F4}" type="datetimeFigureOut">
+            <a:fld id="{75FB6C27-0E58-3B40-BD30-214CA7ADF30F}" type="datetime1">
               <a:rPr lang="en-PH" smtClean="0"/>
-              <a:t>9/18/23</a:t>
+              <a:t>7/11/24</a:t>
             </a:fld>
             <a:endParaRPr lang="en-PH"/>
           </a:p>
@@ -4042,7 +4042,10 @@
           <a:bodyPr/>
           <a:lstStyle/>
           <a:p>
-            <a:endParaRPr lang="en-PH"/>
+            <a:r>
+              <a:rPr lang="en-PH"/>
+              <a:t>CCMACLRL</a:t>
+            </a:r>
           </a:p>
         </p:txBody>
       </p:sp>
@@ -4213,9 +4216,9 @@
           <a:bodyPr/>
           <a:lstStyle/>
           <a:p>
-            <a:fld id="{0CCF0B81-6BD8-4C65-9459-815598C5F1F4}" type="datetimeFigureOut">
+            <a:fld id="{104F09DF-93FD-CE46-B6DD-EAC69207E103}" type="datetime1">
               <a:rPr lang="en-PH" smtClean="0"/>
-              <a:t>9/18/23</a:t>
+              <a:t>7/11/24</a:t>
             </a:fld>
             <a:endParaRPr lang="en-PH"/>
           </a:p>
@@ -4242,7 +4245,10 @@
           <a:bodyPr/>
           <a:lstStyle/>
           <a:p>
-            <a:endParaRPr lang="en-PH"/>
+            <a:r>
+              <a:rPr lang="en-PH"/>
+              <a:t>CCMACLRL</a:t>
+            </a:r>
           </a:p>
         </p:txBody>
       </p:sp>
@@ -4423,9 +4429,9 @@
           <a:bodyPr/>
           <a:lstStyle/>
           <a:p>
-            <a:fld id="{0CCF0B81-6BD8-4C65-9459-815598C5F1F4}" type="datetimeFigureOut">
+            <a:fld id="{2636DB85-36A7-2248-9971-83F4E8A23C65}" type="datetime1">
               <a:rPr lang="en-PH" smtClean="0"/>
-              <a:t>9/18/23</a:t>
+              <a:t>7/11/24</a:t>
             </a:fld>
             <a:endParaRPr lang="en-PH"/>
           </a:p>
@@ -4452,7 +4458,10 @@
           <a:bodyPr/>
           <a:lstStyle/>
           <a:p>
-            <a:endParaRPr lang="en-PH"/>
+            <a:r>
+              <a:rPr lang="en-PH"/>
+              <a:t>CCMACLRL</a:t>
+            </a:r>
           </a:p>
         </p:txBody>
       </p:sp>
@@ -4623,9 +4632,9 @@
           <a:bodyPr/>
           <a:lstStyle/>
           <a:p>
-            <a:fld id="{0CCF0B81-6BD8-4C65-9459-815598C5F1F4}" type="datetimeFigureOut">
+            <a:fld id="{38B5C62B-0655-F341-BB8B-7AEA8390F2F8}" type="datetime1">
               <a:rPr lang="en-PH" smtClean="0"/>
-              <a:t>9/18/23</a:t>
+              <a:t>7/11/24</a:t>
             </a:fld>
             <a:endParaRPr lang="en-PH"/>
           </a:p>
@@ -4652,7 +4661,10 @@
           <a:bodyPr/>
           <a:lstStyle/>
           <a:p>
-            <a:endParaRPr lang="en-PH"/>
+            <a:r>
+              <a:rPr lang="en-PH"/>
+              <a:t>CCMACLRL</a:t>
+            </a:r>
           </a:p>
         </p:txBody>
       </p:sp>
@@ -4899,9 +4911,9 @@
           <a:bodyPr/>
           <a:lstStyle/>
           <a:p>
-            <a:fld id="{0CCF0B81-6BD8-4C65-9459-815598C5F1F4}" type="datetimeFigureOut">
+            <a:fld id="{E3AFE632-5C6F-A74A-87DC-4954B4F5A75C}" type="datetime1">
               <a:rPr lang="en-PH" smtClean="0"/>
-              <a:t>9/18/23</a:t>
+              <a:t>7/11/24</a:t>
             </a:fld>
             <a:endParaRPr lang="en-PH"/>
           </a:p>
@@ -4928,7 +4940,10 @@
           <a:bodyPr/>
           <a:lstStyle/>
           <a:p>
-            <a:endParaRPr lang="en-PH"/>
+            <a:r>
+              <a:rPr lang="en-PH"/>
+              <a:t>CCMACLRL</a:t>
+            </a:r>
           </a:p>
         </p:txBody>
       </p:sp>
@@ -5167,9 +5182,9 @@
           <a:bodyPr/>
           <a:lstStyle/>
           <a:p>
-            <a:fld id="{0CCF0B81-6BD8-4C65-9459-815598C5F1F4}" type="datetimeFigureOut">
+            <a:fld id="{BE379AB4-65FE-434D-A70A-38C5C7121628}" type="datetime1">
               <a:rPr lang="en-PH" smtClean="0"/>
-              <a:t>9/18/23</a:t>
+              <a:t>7/11/24</a:t>
             </a:fld>
             <a:endParaRPr lang="en-PH"/>
           </a:p>
@@ -5196,7 +5211,10 @@
           <a:bodyPr/>
           <a:lstStyle/>
           <a:p>
-            <a:endParaRPr lang="en-PH"/>
+            <a:r>
+              <a:rPr lang="en-PH"/>
+              <a:t>CCMACLRL</a:t>
+            </a:r>
           </a:p>
         </p:txBody>
       </p:sp>
@@ -5582,9 +5600,9 @@
           <a:bodyPr/>
           <a:lstStyle/>
           <a:p>
-            <a:fld id="{0CCF0B81-6BD8-4C65-9459-815598C5F1F4}" type="datetimeFigureOut">
+            <a:fld id="{380E34E5-409F-1D4C-B301-8C49A9E815B1}" type="datetime1">
               <a:rPr lang="en-PH" smtClean="0"/>
-              <a:t>9/18/23</a:t>
+              <a:t>7/11/24</a:t>
             </a:fld>
             <a:endParaRPr lang="en-PH"/>
           </a:p>
@@ -5611,7 +5629,10 @@
           <a:bodyPr/>
           <a:lstStyle/>
           <a:p>
-            <a:endParaRPr lang="en-PH"/>
+            <a:r>
+              <a:rPr lang="en-PH"/>
+              <a:t>CCMACLRL</a:t>
+            </a:r>
           </a:p>
         </p:txBody>
       </p:sp>
@@ -5724,9 +5745,9 @@
           <a:bodyPr/>
           <a:lstStyle/>
           <a:p>
-            <a:fld id="{0CCF0B81-6BD8-4C65-9459-815598C5F1F4}" type="datetimeFigureOut">
+            <a:fld id="{2501FA41-271D-974C-911B-9D1A271A2BE7}" type="datetime1">
               <a:rPr lang="en-PH" smtClean="0"/>
-              <a:t>9/18/23</a:t>
+              <a:t>7/11/24</a:t>
             </a:fld>
             <a:endParaRPr lang="en-PH"/>
           </a:p>
@@ -5753,7 +5774,10 @@
           <a:bodyPr/>
           <a:lstStyle/>
           <a:p>
-            <a:endParaRPr lang="en-PH"/>
+            <a:r>
+              <a:rPr lang="en-PH"/>
+              <a:t>CCMACLRL</a:t>
+            </a:r>
           </a:p>
         </p:txBody>
       </p:sp>
@@ -5837,9 +5861,9 @@
           <a:bodyPr/>
           <a:lstStyle/>
           <a:p>
-            <a:fld id="{0CCF0B81-6BD8-4C65-9459-815598C5F1F4}" type="datetimeFigureOut">
+            <a:fld id="{3FE946B2-C346-B343-958B-B9038E143CA3}" type="datetime1">
               <a:rPr lang="en-PH" smtClean="0"/>
-              <a:t>9/18/23</a:t>
+              <a:t>7/11/24</a:t>
             </a:fld>
             <a:endParaRPr lang="en-PH"/>
           </a:p>
@@ -5866,7 +5890,10 @@
           <a:bodyPr/>
           <a:lstStyle/>
           <a:p>
-            <a:endParaRPr lang="en-PH"/>
+            <a:r>
+              <a:rPr lang="en-PH"/>
+              <a:t>CCMACLRL</a:t>
+            </a:r>
           </a:p>
         </p:txBody>
       </p:sp>
@@ -6150,9 +6177,9 @@
           <a:bodyPr/>
           <a:lstStyle/>
           <a:p>
-            <a:fld id="{0CCF0B81-6BD8-4C65-9459-815598C5F1F4}" type="datetimeFigureOut">
+            <a:fld id="{FE9F6C95-E09D-7143-B418-0891324CCCFE}" type="datetime1">
               <a:rPr lang="en-PH" smtClean="0"/>
-              <a:t>9/18/23</a:t>
+              <a:t>7/11/24</a:t>
             </a:fld>
             <a:endParaRPr lang="en-PH"/>
           </a:p>
@@ -6179,7 +6206,10 @@
           <a:bodyPr/>
           <a:lstStyle/>
           <a:p>
-            <a:endParaRPr lang="en-PH"/>
+            <a:r>
+              <a:rPr lang="en-PH"/>
+              <a:t>CCMACLRL</a:t>
+            </a:r>
           </a:p>
         </p:txBody>
       </p:sp>
@@ -6439,9 +6469,9 @@
           <a:bodyPr/>
           <a:lstStyle/>
           <a:p>
-            <a:fld id="{0CCF0B81-6BD8-4C65-9459-815598C5F1F4}" type="datetimeFigureOut">
+            <a:fld id="{FC997AD4-1CEF-0E48-B1A7-C64E10152381}" type="datetime1">
               <a:rPr lang="en-PH" smtClean="0"/>
-              <a:t>9/18/23</a:t>
+              <a:t>7/11/24</a:t>
             </a:fld>
             <a:endParaRPr lang="en-PH"/>
           </a:p>
@@ -6468,7 +6498,10 @@
           <a:bodyPr/>
           <a:lstStyle/>
           <a:p>
-            <a:endParaRPr lang="en-PH"/>
+            <a:r>
+              <a:rPr lang="en-PH"/>
+              <a:t>CCMACLRL</a:t>
+            </a:r>
           </a:p>
         </p:txBody>
       </p:sp>
@@ -6682,9 +6715,9 @@
             </a:lvl1pPr>
           </a:lstStyle>
           <a:p>
-            <a:fld id="{0CCF0B81-6BD8-4C65-9459-815598C5F1F4}" type="datetimeFigureOut">
+            <a:fld id="{54835927-0B18-2540-B6CD-1F754702085B}" type="datetime1">
               <a:rPr lang="en-PH" smtClean="0"/>
-              <a:t>9/18/23</a:t>
+              <a:t>7/11/24</a:t>
             </a:fld>
             <a:endParaRPr lang="en-PH"/>
           </a:p>
@@ -6729,7 +6762,10 @@
             </a:lvl1pPr>
           </a:lstStyle>
           <a:p>
-            <a:endParaRPr lang="en-PH"/>
+            <a:r>
+              <a:rPr lang="en-PH"/>
+              <a:t>CCMACLRL</a:t>
+            </a:r>
           </a:p>
         </p:txBody>
       </p:sp>
@@ -6801,6 +6837,7 @@
     <p:sldLayoutId id="2147483658" r:id="rId10"/>
     <p:sldLayoutId id="2147483659" r:id="rId11"/>
   </p:sldLayoutIdLst>
+  <p:hf sldNum="0" hdr="0" dt="0"/>
   <p:txStyles>
     <p:titleStyle>
       <a:lvl1pPr algn="l" defTabSz="914400" rtl="0" eaLnBrk="1" latinLnBrk="0" hangingPunct="1">
@@ -7322,12 +7359,12 @@
           <a:p>
             <a:pPr algn="r"/>
             <a:r>
-              <a:rPr lang="en-US" b="1" dirty="0">
+              <a:rPr lang="en-US" b="1">
                 <a:solidFill>
                   <a:schemeClr val="tx1"/>
                 </a:solidFill>
               </a:rPr>
-              <a:t>CCINSYSL</a:t>
+              <a:t>CCMACLRL</a:t>
             </a:r>
             <a:endParaRPr lang="en-PH" b="1" dirty="0">
               <a:solidFill>
@@ -7417,12 +7454,12 @@
           <a:p>
             <a:pPr algn="r"/>
             <a:r>
-              <a:rPr lang="en-US" b="1" dirty="0">
+              <a:rPr lang="en-US" b="1">
                 <a:solidFill>
                   <a:schemeClr val="tx1"/>
                 </a:solidFill>
               </a:rPr>
-              <a:t>CCINSYSL</a:t>
+              <a:t>CCMACLRL</a:t>
             </a:r>
             <a:endParaRPr lang="en-PH" dirty="0"/>
           </a:p>
@@ -8045,12 +8082,12 @@
           <a:p>
             <a:pPr algn="r"/>
             <a:r>
-              <a:rPr lang="en-US" b="1" dirty="0">
+              <a:rPr lang="en-US" b="1">
                 <a:solidFill>
                   <a:schemeClr val="tx1"/>
                 </a:solidFill>
               </a:rPr>
-              <a:t>CCINSYSL</a:t>
+              <a:t>CCMACLRL</a:t>
             </a:r>
             <a:endParaRPr lang="en-PH" dirty="0"/>
           </a:p>
@@ -10338,12 +10375,12 @@
           <a:p>
             <a:pPr algn="r"/>
             <a:r>
-              <a:rPr lang="en-US" b="1" dirty="0">
+              <a:rPr lang="en-US" b="1">
                 <a:solidFill>
                   <a:schemeClr val="tx1"/>
                 </a:solidFill>
               </a:rPr>
-              <a:t>CCINSYSL</a:t>
+              <a:t>CCMACLRL</a:t>
             </a:r>
             <a:endParaRPr lang="en-PH" dirty="0"/>
           </a:p>
@@ -11053,12 +11090,12 @@
           <a:p>
             <a:pPr algn="r"/>
             <a:r>
-              <a:rPr lang="en-US" b="1" dirty="0">
+              <a:rPr lang="en-US" b="1">
                 <a:solidFill>
                   <a:schemeClr val="tx1"/>
                 </a:solidFill>
               </a:rPr>
-              <a:t>CCINSYSL</a:t>
+              <a:t>CCMACLRL</a:t>
             </a:r>
             <a:endParaRPr lang="en-PH" dirty="0"/>
           </a:p>
@@ -11483,12 +11520,12 @@
           <a:p>
             <a:pPr algn="r"/>
             <a:r>
-              <a:rPr lang="en-US" b="1" dirty="0">
+              <a:rPr lang="en-US" b="1">
                 <a:solidFill>
                   <a:schemeClr val="tx1"/>
                 </a:solidFill>
               </a:rPr>
-              <a:t>CCINSYSL</a:t>
+              <a:t>CCMACLRL</a:t>
             </a:r>
             <a:endParaRPr lang="en-PH" dirty="0"/>
           </a:p>
@@ -11786,12 +11823,12 @@
           <a:p>
             <a:pPr algn="r"/>
             <a:r>
-              <a:rPr lang="en-US" b="1" dirty="0">
+              <a:rPr lang="en-US" b="1">
                 <a:solidFill>
                   <a:schemeClr val="tx1"/>
                 </a:solidFill>
               </a:rPr>
-              <a:t>CCINSYSL</a:t>
+              <a:t>CCMACLRL</a:t>
             </a:r>
             <a:endParaRPr lang="en-PH" dirty="0"/>
           </a:p>
@@ -12168,12 +12205,12 @@
           <a:p>
             <a:pPr algn="r"/>
             <a:r>
-              <a:rPr lang="en-US" b="1" dirty="0">
+              <a:rPr lang="en-US" b="1">
                 <a:solidFill>
                   <a:schemeClr val="tx1"/>
                 </a:solidFill>
               </a:rPr>
-              <a:t>CCINSYSL</a:t>
+              <a:t>CCMACLRL</a:t>
             </a:r>
             <a:endParaRPr lang="en-PH" dirty="0"/>
           </a:p>
@@ -13304,12 +13341,12 @@
           <a:p>
             <a:pPr algn="r"/>
             <a:r>
-              <a:rPr lang="en-US" b="1" dirty="0">
+              <a:rPr lang="en-US" b="1">
                 <a:solidFill>
                   <a:schemeClr val="tx1"/>
                 </a:solidFill>
               </a:rPr>
-              <a:t>CCINSYSL</a:t>
+              <a:t>CCMACLRL</a:t>
             </a:r>
             <a:endParaRPr lang="en-PH" dirty="0"/>
           </a:p>
@@ -13578,12 +13615,12 @@
           <a:p>
             <a:pPr algn="r"/>
             <a:r>
-              <a:rPr lang="en-US" b="1" dirty="0">
+              <a:rPr lang="en-US" b="1">
                 <a:solidFill>
                   <a:schemeClr val="tx1"/>
                 </a:solidFill>
               </a:rPr>
-              <a:t>CCINSYSL</a:t>
+              <a:t>CCMACLRL</a:t>
             </a:r>
             <a:endParaRPr lang="en-PH" dirty="0"/>
           </a:p>
@@ -14203,12 +14240,12 @@
           <a:p>
             <a:pPr algn="r"/>
             <a:r>
-              <a:rPr lang="en-US" b="1" dirty="0">
+              <a:rPr lang="en-US" b="1">
                 <a:solidFill>
                   <a:schemeClr val="tx1"/>
                 </a:solidFill>
               </a:rPr>
-              <a:t>CCINSYSL</a:t>
+              <a:t>CCMACLRL</a:t>
             </a:r>
             <a:endParaRPr lang="en-PH" dirty="0"/>
           </a:p>
@@ -16499,12 +16536,12 @@
           <a:p>
             <a:pPr algn="r"/>
             <a:r>
-              <a:rPr lang="en-US" b="1" dirty="0">
+              <a:rPr lang="en-US" b="1">
                 <a:solidFill>
                   <a:schemeClr val="tx1"/>
                 </a:solidFill>
               </a:rPr>
-              <a:t>CCINSYSL</a:t>
+              <a:t>CCMACLRL</a:t>
             </a:r>
             <a:endParaRPr lang="en-PH" dirty="0"/>
           </a:p>
@@ -17524,6 +17561,12 @@
 </file>
 
 <file path=customXml/item1.xml><?xml version="1.0" encoding="utf-8"?>
+<p:properties xmlns:p="http://schemas.microsoft.com/office/2006/metadata/properties" xmlns:xsi="http://www.w3.org/2001/XMLSchema-instance" xmlns:pc="http://schemas.microsoft.com/office/infopath/2007/PartnerControls">
+  <documentManagement/>
+</p:properties>
+</file>
+
+<file path=customXml/item2.xml><?xml version="1.0" encoding="utf-8"?>
 <ct:contentTypeSchema xmlns:ct="http://schemas.microsoft.com/office/2006/metadata/contentType" xmlns:ma="http://schemas.microsoft.com/office/2006/metadata/properties/metaAttributes" ct:_="" ma:_="" ma:contentTypeName="Document" ma:contentTypeID="0x0101007188BDCA587B344BBA6CB1A93FAE6998" ma:contentTypeVersion="2" ma:contentTypeDescription="Create a new document." ma:contentTypeScope="" ma:versionID="7a8e4b6720badb2566a0cfeddfaf2856">
   <xsd:schema xmlns:xsd="http://www.w3.org/2001/XMLSchema" xmlns:xs="http://www.w3.org/2001/XMLSchema" xmlns:p="http://schemas.microsoft.com/office/2006/metadata/properties" xmlns:ns2="ba111d12-426d-4af0-bcb6-460e36974645" targetNamespace="http://schemas.microsoft.com/office/2006/metadata/properties" ma:root="true" ma:fieldsID="989b05398519136c88ba0a8d54e3c3da" ns2:_="">
     <xsd:import namespace="ba111d12-426d-4af0-bcb6-460e36974645"/>
@@ -17655,12 +17698,6 @@
 </ct:contentTypeSchema>
 </file>
 
-<file path=customXml/item2.xml><?xml version="1.0" encoding="utf-8"?>
-<p:properties xmlns:p="http://schemas.microsoft.com/office/2006/metadata/properties" xmlns:xsi="http://www.w3.org/2001/XMLSchema-instance" xmlns:pc="http://schemas.microsoft.com/office/infopath/2007/PartnerControls">
-  <documentManagement/>
-</p:properties>
-</file>
-
 <file path=customXml/item3.xml><?xml version="1.0" encoding="utf-8"?>
 <?mso-contentType ?>
 <FormTemplates xmlns="http://schemas.microsoft.com/sharepoint/v3/contenttype/forms">
@@ -17671,6 +17708,15 @@
 </file>
 
 <file path=customXml/itemProps1.xml><?xml version="1.0" encoding="utf-8"?>
+<ds:datastoreItem xmlns:ds="http://schemas.openxmlformats.org/officeDocument/2006/customXml" ds:itemID="{7ACF14CA-9E7F-410C-99DF-E0FAFDE78C11}">
+  <ds:schemaRefs>
+    <ds:schemaRef ds:uri="http://schemas.microsoft.com/office/2006/metadata/properties"/>
+    <ds:schemaRef ds:uri="http://schemas.microsoft.com/office/infopath/2007/PartnerControls"/>
+  </ds:schemaRefs>
+</ds:datastoreItem>
+</file>
+
+<file path=customXml/itemProps2.xml><?xml version="1.0" encoding="utf-8"?>
 <ds:datastoreItem xmlns:ds="http://schemas.openxmlformats.org/officeDocument/2006/customXml" ds:itemID="{D622FF19-6ECD-4B79-A412-9430824D2BB6}">
   <ds:schemaRefs>
     <ds:schemaRef ds:uri="http://schemas.microsoft.com/office/2006/metadata/contentType"/>
@@ -17688,15 +17734,6 @@
 </ds:datastoreItem>
 </file>
 
-<file path=customXml/itemProps2.xml><?xml version="1.0" encoding="utf-8"?>
-<ds:datastoreItem xmlns:ds="http://schemas.openxmlformats.org/officeDocument/2006/customXml" ds:itemID="{7ACF14CA-9E7F-410C-99DF-E0FAFDE78C11}">
-  <ds:schemaRefs>
-    <ds:schemaRef ds:uri="http://schemas.microsoft.com/office/2006/metadata/properties"/>
-    <ds:schemaRef ds:uri="http://schemas.microsoft.com/office/infopath/2007/PartnerControls"/>
-  </ds:schemaRefs>
-</ds:datastoreItem>
-</file>
-
 <file path=customXml/itemProps3.xml><?xml version="1.0" encoding="utf-8"?>
 <ds:datastoreItem xmlns:ds="http://schemas.openxmlformats.org/officeDocument/2006/customXml" ds:itemID="{6C1A3F1B-CE3A-47AB-9F84-47E786467973}">
   <ds:schemaRefs>

</xml_diff>